<commit_message>
Upload changes to repository.
</commit_message>
<xml_diff>
--- a/results/images/average_of_lines.pptx
+++ b/results/images/average_of_lines.pptx
@@ -133,8 +133,8 @@
           <c:layoutTarget val="inner"/>
           <c:xMode val="edge"/>
           <c:yMode val="edge"/>
-          <c:x val="0.15309022309711287"/>
-          <c:y val="6.8929040119985005E-2"/>
+          <c:x val="0.14475688976377954"/>
+          <c:y val="0.16440463025074389"/>
           <c:w val="0.73086122047244106"/>
           <c:h val="0.6722781520908534"/>
         </c:manualLayout>
@@ -152,14 +152,14 @@
               <c:strCache>
                 <c:ptCount val="1"/>
                 <c:pt idx="0">
-                  <c:v>Projects</c:v>
+                  <c:v># Projetos</c:v>
                 </c:pt>
               </c:strCache>
             </c:strRef>
           </c:tx>
           <c:spPr>
             <a:solidFill>
-              <a:schemeClr val="accent5">
+              <a:schemeClr val="accent6">
                 <a:lumMod val="75000"/>
               </a:schemeClr>
             </a:solidFill>
@@ -175,25 +175,25 @@
               <c:strCache>
                 <c:ptCount val="7"/>
                 <c:pt idx="0">
-                  <c:v>Choose a task</c:v>
+                  <c:v>ET</c:v>
                 </c:pt>
                 <c:pt idx="1">
-                  <c:v>Build local workspace</c:v>
+                  <c:v>CC</c:v>
                 </c:pt>
                 <c:pt idx="2">
-                  <c:v>Talk to the community</c:v>
+                  <c:v>CA</c:v>
                 </c:pt>
                 <c:pt idx="3">
-                  <c:v>Deal with the code</c:v>
+                  <c:v>CF</c:v>
                 </c:pt>
                 <c:pt idx="4">
-                  <c:v>Contribution flow</c:v>
+                  <c:v>LC</c:v>
                 </c:pt>
                 <c:pt idx="5">
-                  <c:v>Submit the changes</c:v>
+                  <c:v>SM</c:v>
                 </c:pt>
                 <c:pt idx="6">
-                  <c:v>No categories identified</c:v>
+                  <c:v>NC</c:v>
                 </c:pt>
               </c:strCache>
             </c:strRef>
@@ -202,22 +202,22 @@
             <c:numRef>
               <c:f>'Average per Category (%)'!$B$4:$H$4</c:f>
               <c:numCache>
-                <c:formatCode>0</c:formatCode>
+                <c:formatCode>General</c:formatCode>
                 <c:ptCount val="7"/>
                 <c:pt idx="0">
                   <c:v>116</c:v>
                 </c:pt>
                 <c:pt idx="1">
+                  <c:v>183</c:v>
+                </c:pt>
+                <c:pt idx="2">
                   <c:v>139</c:v>
                 </c:pt>
-                <c:pt idx="2">
-                  <c:v>183</c:v>
-                </c:pt>
                 <c:pt idx="3">
-                  <c:v>280</c:v>
+                  <c:v>319</c:v>
                 </c:pt>
                 <c:pt idx="4">
-                  <c:v>319</c:v>
+                  <c:v>280</c:v>
                 </c:pt>
                 <c:pt idx="5">
                   <c:v>396</c:v>
@@ -242,7 +242,7 @@
           <c:showPercent val="0"/>
           <c:showBubbleSize val="0"/>
         </c:dLbls>
-        <c:gapWidth val="219"/>
+        <c:gapWidth val="125"/>
         <c:overlap val="-27"/>
         <c:axId val="1483099343"/>
         <c:axId val="92192927"/>
@@ -259,7 +259,7 @@
               <c:strCache>
                 <c:ptCount val="1"/>
                 <c:pt idx="0">
-                  <c:v>Average</c:v>
+                  <c:v>Média</c:v>
                 </c:pt>
               </c:strCache>
             </c:strRef>
@@ -316,25 +316,25 @@
               <c:strCache>
                 <c:ptCount val="7"/>
                 <c:pt idx="0">
-                  <c:v>Choose a task</c:v>
+                  <c:v>ET</c:v>
                 </c:pt>
                 <c:pt idx="1">
-                  <c:v>Build local workspace</c:v>
+                  <c:v>CC</c:v>
                 </c:pt>
                 <c:pt idx="2">
-                  <c:v>Talk to the community</c:v>
+                  <c:v>CA</c:v>
                 </c:pt>
                 <c:pt idx="3">
-                  <c:v>Deal with the code</c:v>
+                  <c:v>CF</c:v>
                 </c:pt>
                 <c:pt idx="4">
-                  <c:v>Contribution flow</c:v>
+                  <c:v>LC</c:v>
                 </c:pt>
                 <c:pt idx="5">
-                  <c:v>Submit the changes</c:v>
+                  <c:v>SM</c:v>
                 </c:pt>
                 <c:pt idx="6">
-                  <c:v>No categories identified</c:v>
+                  <c:v>NC</c:v>
                 </c:pt>
               </c:strCache>
             </c:strRef>
@@ -343,22 +343,22 @@
             <c:numRef>
               <c:f>'Average per Category (%)'!$B$5:$H$5</c:f>
               <c:numCache>
-                <c:formatCode>General</c:formatCode>
+                <c:formatCode>0</c:formatCode>
                 <c:ptCount val="7"/>
                 <c:pt idx="0">
                   <c:v>1</c:v>
                 </c:pt>
                 <c:pt idx="1">
+                  <c:v>1</c:v>
+                </c:pt>
+                <c:pt idx="2">
                   <c:v>3</c:v>
                 </c:pt>
-                <c:pt idx="2">
-                  <c:v>1</c:v>
-                </c:pt>
                 <c:pt idx="3">
-                  <c:v>5</c:v>
+                  <c:v>4</c:v>
                 </c:pt>
                 <c:pt idx="4">
-                  <c:v>4</c:v>
+                  <c:v>5</c:v>
                 </c:pt>
                 <c:pt idx="5">
                   <c:v>12</c:v>
@@ -418,7 +418,7 @@
           <a:lstStyle/>
           <a:p>
             <a:pPr>
-              <a:defRPr sz="2200" b="0" i="0" u="none" strike="noStrike" kern="1200" baseline="0">
+              <a:defRPr sz="2500" b="0" i="0" u="none" strike="noStrike" kern="1200" baseline="0">
                 <a:solidFill>
                   <a:schemeClr val="tx1"/>
                 </a:solidFill>
@@ -432,7 +432,7 @@
         </c:txPr>
         <c:crossAx val="92192927"/>
         <c:crosses val="autoZero"/>
-        <c:auto val="1"/>
+        <c:auto val="0"/>
         <c:lblAlgn val="ctr"/>
         <c:lblOffset val="0"/>
         <c:noMultiLvlLbl val="0"/>
@@ -476,8 +476,13 @@
                 </a:pPr>
                 <a:r>
                   <a:rPr lang="en-US" sz="2500" b="0" dirty="0"/>
-                  <a:t># Projects</a:t>
+                  <a:t># </a:t>
                 </a:r>
+                <a:r>
+                  <a:rPr lang="en-US" sz="2500" b="0" dirty="0" err="1"/>
+                  <a:t>Projetos</a:t>
+                </a:r>
+                <a:endParaRPr lang="en-US" sz="2500" b="0" dirty="0"/>
               </a:p>
             </c:rich>
           </c:tx>
@@ -485,8 +490,105 @@
             <c:manualLayout>
               <c:xMode val="edge"/>
               <c:yMode val="edge"/>
-              <c:x val="0"/>
-              <c:y val="0.30373721922147018"/>
+              <c:x val="4.1666666666666666E-3"/>
+              <c:y val="0.35943128775618527"/>
+            </c:manualLayout>
+          </c:layout>
+          <c:overlay val="0"/>
+          <c:spPr>
+            <a:noFill/>
+            <a:ln>
+              <a:noFill/>
+            </a:ln>
+            <a:effectLst/>
+          </c:spPr>
+          <c:txPr>
+            <a:bodyPr rot="-5400000" spcFirstLastPara="1" vertOverflow="ellipsis" vert="horz" wrap="square" anchor="ctr" anchorCtr="1"/>
+            <a:lstStyle/>
+            <a:p>
+              <a:pPr>
+                <a:defRPr sz="2500" b="0" i="0" u="none" strike="noStrike" kern="1200" baseline="0">
+                  <a:solidFill>
+                    <a:schemeClr val="tx1"/>
+                  </a:solidFill>
+                  <a:latin typeface="+mn-lt"/>
+                  <a:ea typeface="+mn-ea"/>
+                  <a:cs typeface="+mn-cs"/>
+                </a:defRPr>
+              </a:pPr>
+              <a:endParaRPr lang="en-US"/>
+            </a:p>
+          </c:txPr>
+        </c:title>
+        <c:numFmt formatCode="General" sourceLinked="1"/>
+        <c:majorTickMark val="none"/>
+        <c:minorTickMark val="none"/>
+        <c:tickLblPos val="nextTo"/>
+        <c:spPr>
+          <a:noFill/>
+          <a:ln>
+            <a:noFill/>
+          </a:ln>
+          <a:effectLst/>
+        </c:spPr>
+        <c:txPr>
+          <a:bodyPr rot="-60000000" spcFirstLastPara="1" vertOverflow="ellipsis" vert="horz" wrap="square" anchor="ctr" anchorCtr="1"/>
+          <a:lstStyle/>
+          <a:p>
+            <a:pPr>
+              <a:defRPr sz="2500" b="0" i="0" u="none" strike="noStrike" kern="1200" baseline="0">
+                <a:solidFill>
+                  <a:schemeClr val="tx1"/>
+                </a:solidFill>
+                <a:latin typeface="+mn-lt"/>
+                <a:ea typeface="+mn-ea"/>
+                <a:cs typeface="+mn-cs"/>
+              </a:defRPr>
+            </a:pPr>
+            <a:endParaRPr lang="en-US"/>
+          </a:p>
+        </c:txPr>
+        <c:crossAx val="1483099343"/>
+        <c:crosses val="autoZero"/>
+        <c:crossBetween val="between"/>
+      </c:valAx>
+      <c:valAx>
+        <c:axId val="92196255"/>
+        <c:scaling>
+          <c:orientation val="minMax"/>
+        </c:scaling>
+        <c:delete val="0"/>
+        <c:axPos val="r"/>
+        <c:title>
+          <c:tx>
+            <c:rich>
+              <a:bodyPr rot="-5400000" spcFirstLastPara="1" vertOverflow="ellipsis" vert="horz" wrap="square" anchor="ctr" anchorCtr="1"/>
+              <a:lstStyle/>
+              <a:p>
+                <a:pPr>
+                  <a:defRPr sz="2500" b="0" i="0" u="none" strike="noStrike" kern="1200" baseline="0">
+                    <a:solidFill>
+                      <a:schemeClr val="tx1"/>
+                    </a:solidFill>
+                    <a:latin typeface="+mn-lt"/>
+                    <a:ea typeface="+mn-ea"/>
+                    <a:cs typeface="+mn-cs"/>
+                  </a:defRPr>
+                </a:pPr>
+                <a:r>
+                  <a:rPr lang="en-US" sz="2500" dirty="0" err="1"/>
+                  <a:t>Média</a:t>
+                </a:r>
+                <a:endParaRPr lang="en-US" sz="2500" dirty="0"/>
+              </a:p>
+            </c:rich>
+          </c:tx>
+          <c:layout>
+            <c:manualLayout>
+              <c:xMode val="edge"/>
+              <c:yMode val="edge"/>
+              <c:x val="0.95066666666666688"/>
+              <c:y val="0.4298564060943344"/>
             </c:manualLayout>
           </c:layout>
           <c:overlay val="0"/>
@@ -516,102 +618,6 @@
           </c:txPr>
         </c:title>
         <c:numFmt formatCode="0" sourceLinked="1"/>
-        <c:majorTickMark val="none"/>
-        <c:minorTickMark val="none"/>
-        <c:tickLblPos val="nextTo"/>
-        <c:spPr>
-          <a:noFill/>
-          <a:ln>
-            <a:noFill/>
-          </a:ln>
-          <a:effectLst/>
-        </c:spPr>
-        <c:txPr>
-          <a:bodyPr rot="-60000000" spcFirstLastPara="1" vertOverflow="ellipsis" vert="horz" wrap="square" anchor="ctr" anchorCtr="1"/>
-          <a:lstStyle/>
-          <a:p>
-            <a:pPr>
-              <a:defRPr sz="2500" b="0" i="0" u="none" strike="noStrike" kern="1200" baseline="0">
-                <a:solidFill>
-                  <a:schemeClr val="tx1"/>
-                </a:solidFill>
-                <a:latin typeface="+mn-lt"/>
-                <a:ea typeface="+mn-ea"/>
-                <a:cs typeface="+mn-cs"/>
-              </a:defRPr>
-            </a:pPr>
-            <a:endParaRPr lang="en-US"/>
-          </a:p>
-        </c:txPr>
-        <c:crossAx val="1483099343"/>
-        <c:crosses val="autoZero"/>
-        <c:crossBetween val="between"/>
-      </c:valAx>
-      <c:valAx>
-        <c:axId val="92196255"/>
-        <c:scaling>
-          <c:orientation val="minMax"/>
-        </c:scaling>
-        <c:delete val="0"/>
-        <c:axPos val="r"/>
-        <c:title>
-          <c:tx>
-            <c:rich>
-              <a:bodyPr rot="-5400000" spcFirstLastPara="1" vertOverflow="ellipsis" vert="horz" wrap="square" anchor="ctr" anchorCtr="1"/>
-              <a:lstStyle/>
-              <a:p>
-                <a:pPr>
-                  <a:defRPr sz="2500" b="0" i="0" u="none" strike="noStrike" kern="1200" baseline="0">
-                    <a:solidFill>
-                      <a:schemeClr val="tx1"/>
-                    </a:solidFill>
-                    <a:latin typeface="+mn-lt"/>
-                    <a:ea typeface="+mn-ea"/>
-                    <a:cs typeface="+mn-cs"/>
-                  </a:defRPr>
-                </a:pPr>
-                <a:r>
-                  <a:rPr lang="en-US" sz="2500" dirty="0"/>
-                  <a:t>Average</a:t>
-                </a:r>
-              </a:p>
-            </c:rich>
-          </c:tx>
-          <c:layout>
-            <c:manualLayout>
-              <c:xMode val="edge"/>
-              <c:yMode val="edge"/>
-              <c:x val="0.95344444444444443"/>
-              <c:y val="0.26277420049018929"/>
-            </c:manualLayout>
-          </c:layout>
-          <c:overlay val="0"/>
-          <c:spPr>
-            <a:noFill/>
-            <a:ln>
-              <a:noFill/>
-            </a:ln>
-            <a:effectLst/>
-          </c:spPr>
-          <c:txPr>
-            <a:bodyPr rot="-5400000" spcFirstLastPara="1" vertOverflow="ellipsis" vert="horz" wrap="square" anchor="ctr" anchorCtr="1"/>
-            <a:lstStyle/>
-            <a:p>
-              <a:pPr>
-                <a:defRPr sz="2500" b="0" i="0" u="none" strike="noStrike" kern="1200" baseline="0">
-                  <a:solidFill>
-                    <a:schemeClr val="tx1"/>
-                  </a:solidFill>
-                  <a:latin typeface="+mn-lt"/>
-                  <a:ea typeface="+mn-ea"/>
-                  <a:cs typeface="+mn-cs"/>
-                </a:defRPr>
-              </a:pPr>
-              <a:endParaRPr lang="en-US"/>
-            </a:p>
-          </c:txPr>
-        </c:title>
-        <c:numFmt formatCode="General" sourceLinked="1"/>
         <c:majorTickMark val="out"/>
         <c:minorTickMark val="none"/>
         <c:tickLblPos val="nextTo"/>
@@ -680,7 +686,7 @@
           <c:xMode val="edge"/>
           <c:yMode val="edge"/>
           <c:x val="0.33773173665791778"/>
-          <c:y val="0"/>
+          <c:y val="6.7628511792153997E-2"/>
           <c:w val="0.32207556867891513"/>
           <c:h val="6.481686972709437E-2"/>
         </c:manualLayout>
@@ -744,7 +750,7 @@
     </a:p>
   </c:txPr>
   <c:externalData r:id="rId3">
-    <c:autoUpdate val="0"/>
+    <c:autoUpdate val="1"/>
   </c:externalData>
 </c:chartSpace>
 </file>
@@ -1423,7 +1429,7 @@
           <a:p>
             <a:fld id="{857C8E90-7EDD-4CDC-BF79-D3D421C99482}" type="datetimeFigureOut">
               <a:rPr lang="en-US" smtClean="0"/>
-              <a:t>8/30/2022</a:t>
+              <a:t>12/5/2022</a:t>
             </a:fld>
             <a:endParaRPr lang="en-US"/>
           </a:p>
@@ -1593,7 +1599,7 @@
           <a:p>
             <a:fld id="{857C8E90-7EDD-4CDC-BF79-D3D421C99482}" type="datetimeFigureOut">
               <a:rPr lang="en-US" smtClean="0"/>
-              <a:t>8/30/2022</a:t>
+              <a:t>12/5/2022</a:t>
             </a:fld>
             <a:endParaRPr lang="en-US"/>
           </a:p>
@@ -1773,7 +1779,7 @@
           <a:p>
             <a:fld id="{857C8E90-7EDD-4CDC-BF79-D3D421C99482}" type="datetimeFigureOut">
               <a:rPr lang="en-US" smtClean="0"/>
-              <a:t>8/30/2022</a:t>
+              <a:t>12/5/2022</a:t>
             </a:fld>
             <a:endParaRPr lang="en-US"/>
           </a:p>
@@ -1943,7 +1949,7 @@
           <a:p>
             <a:fld id="{857C8E90-7EDD-4CDC-BF79-D3D421C99482}" type="datetimeFigureOut">
               <a:rPr lang="en-US" smtClean="0"/>
-              <a:t>8/30/2022</a:t>
+              <a:t>12/5/2022</a:t>
             </a:fld>
             <a:endParaRPr lang="en-US"/>
           </a:p>
@@ -2187,7 +2193,7 @@
           <a:p>
             <a:fld id="{857C8E90-7EDD-4CDC-BF79-D3D421C99482}" type="datetimeFigureOut">
               <a:rPr lang="en-US" smtClean="0"/>
-              <a:t>8/30/2022</a:t>
+              <a:t>12/5/2022</a:t>
             </a:fld>
             <a:endParaRPr lang="en-US"/>
           </a:p>
@@ -2419,7 +2425,7 @@
           <a:p>
             <a:fld id="{857C8E90-7EDD-4CDC-BF79-D3D421C99482}" type="datetimeFigureOut">
               <a:rPr lang="en-US" smtClean="0"/>
-              <a:t>8/30/2022</a:t>
+              <a:t>12/5/2022</a:t>
             </a:fld>
             <a:endParaRPr lang="en-US"/>
           </a:p>
@@ -2786,7 +2792,7 @@
           <a:p>
             <a:fld id="{857C8E90-7EDD-4CDC-BF79-D3D421C99482}" type="datetimeFigureOut">
               <a:rPr lang="en-US" smtClean="0"/>
-              <a:t>8/30/2022</a:t>
+              <a:t>12/5/2022</a:t>
             </a:fld>
             <a:endParaRPr lang="en-US"/>
           </a:p>
@@ -2904,7 +2910,7 @@
           <a:p>
             <a:fld id="{857C8E90-7EDD-4CDC-BF79-D3D421C99482}" type="datetimeFigureOut">
               <a:rPr lang="en-US" smtClean="0"/>
-              <a:t>8/30/2022</a:t>
+              <a:t>12/5/2022</a:t>
             </a:fld>
             <a:endParaRPr lang="en-US"/>
           </a:p>
@@ -2999,7 +3005,7 @@
           <a:p>
             <a:fld id="{857C8E90-7EDD-4CDC-BF79-D3D421C99482}" type="datetimeFigureOut">
               <a:rPr lang="en-US" smtClean="0"/>
-              <a:t>8/30/2022</a:t>
+              <a:t>12/5/2022</a:t>
             </a:fld>
             <a:endParaRPr lang="en-US"/>
           </a:p>
@@ -3276,7 +3282,7 @@
           <a:p>
             <a:fld id="{857C8E90-7EDD-4CDC-BF79-D3D421C99482}" type="datetimeFigureOut">
               <a:rPr lang="en-US" smtClean="0"/>
-              <a:t>8/30/2022</a:t>
+              <a:t>12/5/2022</a:t>
             </a:fld>
             <a:endParaRPr lang="en-US"/>
           </a:p>
@@ -3533,7 +3539,7 @@
           <a:p>
             <a:fld id="{857C8E90-7EDD-4CDC-BF79-D3D421C99482}" type="datetimeFigureOut">
               <a:rPr lang="en-US" smtClean="0"/>
-              <a:t>8/30/2022</a:t>
+              <a:t>12/5/2022</a:t>
             </a:fld>
             <a:endParaRPr lang="en-US"/>
           </a:p>
@@ -3746,7 +3752,7 @@
           <a:p>
             <a:fld id="{857C8E90-7EDD-4CDC-BF79-D3D421C99482}" type="datetimeFigureOut">
               <a:rPr lang="en-US" smtClean="0"/>
-              <a:t>8/30/2022</a:t>
+              <a:t>12/5/2022</a:t>
             </a:fld>
             <a:endParaRPr lang="en-US"/>
           </a:p>
@@ -4166,7 +4172,7 @@
           <p:nvPr>
             <p:extLst>
               <p:ext uri="{D42A27DB-BD31-4B8C-83A1-F6EECF244321}">
-                <p14:modId xmlns:p14="http://schemas.microsoft.com/office/powerpoint/2010/main" val="2672350802"/>
+                <p14:modId xmlns:p14="http://schemas.microsoft.com/office/powerpoint/2010/main" val="3082786181"/>
               </p:ext>
             </p:extLst>
           </p:nvPr>

</xml_diff>